<commit_message>
update to ppt day 2
</commit_message>
<xml_diff>
--- a/R_Day2.pptx
+++ b/R_Day2.pptx
@@ -6,11 +6,12 @@
   </p:sldMasterIdLst>
   <p:sldIdLst>
     <p:sldId id="256" r:id="rId2"/>
-    <p:sldId id="257" r:id="rId3"/>
-    <p:sldId id="258" r:id="rId4"/>
-    <p:sldId id="259" r:id="rId5"/>
-    <p:sldId id="261" r:id="rId6"/>
-    <p:sldId id="260" r:id="rId7"/>
+    <p:sldId id="262" r:id="rId3"/>
+    <p:sldId id="257" r:id="rId4"/>
+    <p:sldId id="258" r:id="rId5"/>
+    <p:sldId id="259" r:id="rId6"/>
+    <p:sldId id="261" r:id="rId7"/>
+    <p:sldId id="260" r:id="rId8"/>
   </p:sldIdLst>
   <p:sldSz cx="12192000" cy="6858000"/>
   <p:notesSz cx="6858000" cy="9144000"/>
@@ -109,6 +110,11 @@
       </a:defRPr>
     </a:lvl9pPr>
   </p:defaultTextStyle>
+  <p:extLst>
+    <p:ext uri="{EFAFB233-063F-42B5-8137-9DF3F51BA10A}">
+      <p15:sldGuideLst xmlns:p15="http://schemas.microsoft.com/office/powerpoint/2012/main"/>
+    </p:ext>
+  </p:extLst>
 </p:presentation>
 </file>
 
@@ -134,7 +140,7 @@
           <p:cNvPr id="2" name="Title 1">
             <a:extLst>
               <a:ext uri="{FF2B5EF4-FFF2-40B4-BE49-F238E27FC236}">
-                <a16:creationId xmlns:a16="http://schemas.microsoft.com/office/drawing/2014/main" id="{5837D691-D26E-4042-BB9E-3A912B503AFE}"/>
+                <a16:creationId xmlns:a16="http://schemas.microsoft.com/office/drawing/2014/main" xmlns="" id="{5837D691-D26E-4042-BB9E-3A912B503AFE}"/>
               </a:ext>
             </a:extLst>
           </p:cNvPr>
@@ -171,7 +177,7 @@
           <p:cNvPr id="3" name="Subtitle 2">
             <a:extLst>
               <a:ext uri="{FF2B5EF4-FFF2-40B4-BE49-F238E27FC236}">
-                <a16:creationId xmlns:a16="http://schemas.microsoft.com/office/drawing/2014/main" id="{B959717A-AA50-47CA-BC3A-9073D97E96E2}"/>
+                <a16:creationId xmlns:a16="http://schemas.microsoft.com/office/drawing/2014/main" xmlns="" id="{B959717A-AA50-47CA-BC3A-9073D97E96E2}"/>
               </a:ext>
             </a:extLst>
           </p:cNvPr>
@@ -241,7 +247,7 @@
           <p:cNvPr id="4" name="Date Placeholder 3">
             <a:extLst>
               <a:ext uri="{FF2B5EF4-FFF2-40B4-BE49-F238E27FC236}">
-                <a16:creationId xmlns:a16="http://schemas.microsoft.com/office/drawing/2014/main" id="{AA73C987-94A2-42FD-80F7-0DB7CD68A714}"/>
+                <a16:creationId xmlns:a16="http://schemas.microsoft.com/office/drawing/2014/main" xmlns="" id="{AA73C987-94A2-42FD-80F7-0DB7CD68A714}"/>
               </a:ext>
             </a:extLst>
           </p:cNvPr>
@@ -259,7 +265,7 @@
           <a:p>
             <a:fld id="{51B7D679-E93A-402E-ABAD-5AF933A0E160}" type="datetimeFigureOut">
               <a:rPr lang="en-US" smtClean="0"/>
-              <a:t>9/4/2018</a:t>
+              <a:t>9/5/2018</a:t>
             </a:fld>
             <a:endParaRPr lang="en-US"/>
           </a:p>
@@ -270,7 +276,7 @@
           <p:cNvPr id="5" name="Footer Placeholder 4">
             <a:extLst>
               <a:ext uri="{FF2B5EF4-FFF2-40B4-BE49-F238E27FC236}">
-                <a16:creationId xmlns:a16="http://schemas.microsoft.com/office/drawing/2014/main" id="{E21C96A0-CF2B-4AF3-AB3D-FEF57441E985}"/>
+                <a16:creationId xmlns:a16="http://schemas.microsoft.com/office/drawing/2014/main" xmlns="" id="{E21C96A0-CF2B-4AF3-AB3D-FEF57441E985}"/>
               </a:ext>
             </a:extLst>
           </p:cNvPr>
@@ -295,7 +301,7 @@
           <p:cNvPr id="6" name="Slide Number Placeholder 5">
             <a:extLst>
               <a:ext uri="{FF2B5EF4-FFF2-40B4-BE49-F238E27FC236}">
-                <a16:creationId xmlns:a16="http://schemas.microsoft.com/office/drawing/2014/main" id="{7654FB0D-B737-4788-B65F-9C73CCDB8CCC}"/>
+                <a16:creationId xmlns:a16="http://schemas.microsoft.com/office/drawing/2014/main" xmlns="" id="{7654FB0D-B737-4788-B65F-9C73CCDB8CCC}"/>
               </a:ext>
             </a:extLst>
           </p:cNvPr>
@@ -354,7 +360,7 @@
           <p:cNvPr id="2" name="Title 1">
             <a:extLst>
               <a:ext uri="{FF2B5EF4-FFF2-40B4-BE49-F238E27FC236}">
-                <a16:creationId xmlns:a16="http://schemas.microsoft.com/office/drawing/2014/main" id="{7F37F5A5-7BB8-44FB-BBE5-D67401BAE040}"/>
+                <a16:creationId xmlns:a16="http://schemas.microsoft.com/office/drawing/2014/main" xmlns="" id="{7F37F5A5-7BB8-44FB-BBE5-D67401BAE040}"/>
               </a:ext>
             </a:extLst>
           </p:cNvPr>
@@ -382,7 +388,7 @@
           <p:cNvPr id="3" name="Vertical Text Placeholder 2">
             <a:extLst>
               <a:ext uri="{FF2B5EF4-FFF2-40B4-BE49-F238E27FC236}">
-                <a16:creationId xmlns:a16="http://schemas.microsoft.com/office/drawing/2014/main" id="{75955D7F-504B-45BA-8A8A-4F9CD1C7406A}"/>
+                <a16:creationId xmlns:a16="http://schemas.microsoft.com/office/drawing/2014/main" xmlns="" id="{75955D7F-504B-45BA-8A8A-4F9CD1C7406A}"/>
               </a:ext>
             </a:extLst>
           </p:cNvPr>
@@ -439,7 +445,7 @@
           <p:cNvPr id="4" name="Date Placeholder 3">
             <a:extLst>
               <a:ext uri="{FF2B5EF4-FFF2-40B4-BE49-F238E27FC236}">
-                <a16:creationId xmlns:a16="http://schemas.microsoft.com/office/drawing/2014/main" id="{AFD87FBB-D8DD-4FDE-A851-7F92B4BB2D7F}"/>
+                <a16:creationId xmlns:a16="http://schemas.microsoft.com/office/drawing/2014/main" xmlns="" id="{AFD87FBB-D8DD-4FDE-A851-7F92B4BB2D7F}"/>
               </a:ext>
             </a:extLst>
           </p:cNvPr>
@@ -457,7 +463,7 @@
           <a:p>
             <a:fld id="{51B7D679-E93A-402E-ABAD-5AF933A0E160}" type="datetimeFigureOut">
               <a:rPr lang="en-US" smtClean="0"/>
-              <a:t>9/4/2018</a:t>
+              <a:t>9/5/2018</a:t>
             </a:fld>
             <a:endParaRPr lang="en-US"/>
           </a:p>
@@ -468,7 +474,7 @@
           <p:cNvPr id="5" name="Footer Placeholder 4">
             <a:extLst>
               <a:ext uri="{FF2B5EF4-FFF2-40B4-BE49-F238E27FC236}">
-                <a16:creationId xmlns:a16="http://schemas.microsoft.com/office/drawing/2014/main" id="{D367F06B-A503-4B10-AE58-4DB57D55B695}"/>
+                <a16:creationId xmlns:a16="http://schemas.microsoft.com/office/drawing/2014/main" xmlns="" id="{D367F06B-A503-4B10-AE58-4DB57D55B695}"/>
               </a:ext>
             </a:extLst>
           </p:cNvPr>
@@ -493,7 +499,7 @@
           <p:cNvPr id="6" name="Slide Number Placeholder 5">
             <a:extLst>
               <a:ext uri="{FF2B5EF4-FFF2-40B4-BE49-F238E27FC236}">
-                <a16:creationId xmlns:a16="http://schemas.microsoft.com/office/drawing/2014/main" id="{11811B4D-DCF5-47F8-B9C9-728FDC01A851}"/>
+                <a16:creationId xmlns:a16="http://schemas.microsoft.com/office/drawing/2014/main" xmlns="" id="{11811B4D-DCF5-47F8-B9C9-728FDC01A851}"/>
               </a:ext>
             </a:extLst>
           </p:cNvPr>
@@ -552,7 +558,7 @@
           <p:cNvPr id="2" name="Vertical Title 1">
             <a:extLst>
               <a:ext uri="{FF2B5EF4-FFF2-40B4-BE49-F238E27FC236}">
-                <a16:creationId xmlns:a16="http://schemas.microsoft.com/office/drawing/2014/main" id="{D6C91DB2-92C7-4E2C-9288-9C0A35D59CC9}"/>
+                <a16:creationId xmlns:a16="http://schemas.microsoft.com/office/drawing/2014/main" xmlns="" id="{D6C91DB2-92C7-4E2C-9288-9C0A35D59CC9}"/>
               </a:ext>
             </a:extLst>
           </p:cNvPr>
@@ -585,7 +591,7 @@
           <p:cNvPr id="3" name="Vertical Text Placeholder 2">
             <a:extLst>
               <a:ext uri="{FF2B5EF4-FFF2-40B4-BE49-F238E27FC236}">
-                <a16:creationId xmlns:a16="http://schemas.microsoft.com/office/drawing/2014/main" id="{8492A0AF-C8C3-4444-ACEB-6ACF59747FDB}"/>
+                <a16:creationId xmlns:a16="http://schemas.microsoft.com/office/drawing/2014/main" xmlns="" id="{8492A0AF-C8C3-4444-ACEB-6ACF59747FDB}"/>
               </a:ext>
             </a:extLst>
           </p:cNvPr>
@@ -647,7 +653,7 @@
           <p:cNvPr id="4" name="Date Placeholder 3">
             <a:extLst>
               <a:ext uri="{FF2B5EF4-FFF2-40B4-BE49-F238E27FC236}">
-                <a16:creationId xmlns:a16="http://schemas.microsoft.com/office/drawing/2014/main" id="{96B71E39-5F04-4531-8023-0337512EF1D1}"/>
+                <a16:creationId xmlns:a16="http://schemas.microsoft.com/office/drawing/2014/main" xmlns="" id="{96B71E39-5F04-4531-8023-0337512EF1D1}"/>
               </a:ext>
             </a:extLst>
           </p:cNvPr>
@@ -665,7 +671,7 @@
           <a:p>
             <a:fld id="{51B7D679-E93A-402E-ABAD-5AF933A0E160}" type="datetimeFigureOut">
               <a:rPr lang="en-US" smtClean="0"/>
-              <a:t>9/4/2018</a:t>
+              <a:t>9/5/2018</a:t>
             </a:fld>
             <a:endParaRPr lang="en-US"/>
           </a:p>
@@ -676,7 +682,7 @@
           <p:cNvPr id="5" name="Footer Placeholder 4">
             <a:extLst>
               <a:ext uri="{FF2B5EF4-FFF2-40B4-BE49-F238E27FC236}">
-                <a16:creationId xmlns:a16="http://schemas.microsoft.com/office/drawing/2014/main" id="{32E75B7D-1052-4A65-B6F0-BCDDE1ED2E5A}"/>
+                <a16:creationId xmlns:a16="http://schemas.microsoft.com/office/drawing/2014/main" xmlns="" id="{32E75B7D-1052-4A65-B6F0-BCDDE1ED2E5A}"/>
               </a:ext>
             </a:extLst>
           </p:cNvPr>
@@ -701,7 +707,7 @@
           <p:cNvPr id="6" name="Slide Number Placeholder 5">
             <a:extLst>
               <a:ext uri="{FF2B5EF4-FFF2-40B4-BE49-F238E27FC236}">
-                <a16:creationId xmlns:a16="http://schemas.microsoft.com/office/drawing/2014/main" id="{4FD3FCA4-C6B9-4F69-A003-69E3F50998E7}"/>
+                <a16:creationId xmlns:a16="http://schemas.microsoft.com/office/drawing/2014/main" xmlns="" id="{4FD3FCA4-C6B9-4F69-A003-69E3F50998E7}"/>
               </a:ext>
             </a:extLst>
           </p:cNvPr>
@@ -760,7 +766,7 @@
           <p:cNvPr id="2" name="Title 1">
             <a:extLst>
               <a:ext uri="{FF2B5EF4-FFF2-40B4-BE49-F238E27FC236}">
-                <a16:creationId xmlns:a16="http://schemas.microsoft.com/office/drawing/2014/main" id="{E6ED1454-61E9-4D13-92C1-45CA4FC1ED1F}"/>
+                <a16:creationId xmlns:a16="http://schemas.microsoft.com/office/drawing/2014/main" xmlns="" id="{E6ED1454-61E9-4D13-92C1-45CA4FC1ED1F}"/>
               </a:ext>
             </a:extLst>
           </p:cNvPr>
@@ -788,7 +794,7 @@
           <p:cNvPr id="3" name="Content Placeholder 2">
             <a:extLst>
               <a:ext uri="{FF2B5EF4-FFF2-40B4-BE49-F238E27FC236}">
-                <a16:creationId xmlns:a16="http://schemas.microsoft.com/office/drawing/2014/main" id="{6203F209-1EE4-49C0-9AE8-4586DA6A3474}"/>
+                <a16:creationId xmlns:a16="http://schemas.microsoft.com/office/drawing/2014/main" xmlns="" id="{6203F209-1EE4-49C0-9AE8-4586DA6A3474}"/>
               </a:ext>
             </a:extLst>
           </p:cNvPr>
@@ -819,7 +825,7 @@
           <p:cNvPr id="4" name="Date Placeholder 3">
             <a:extLst>
               <a:ext uri="{FF2B5EF4-FFF2-40B4-BE49-F238E27FC236}">
-                <a16:creationId xmlns:a16="http://schemas.microsoft.com/office/drawing/2014/main" id="{4BB5D536-1E22-47AC-8E9A-D0BB785358EC}"/>
+                <a16:creationId xmlns:a16="http://schemas.microsoft.com/office/drawing/2014/main" xmlns="" id="{4BB5D536-1E22-47AC-8E9A-D0BB785358EC}"/>
               </a:ext>
             </a:extLst>
           </p:cNvPr>
@@ -837,7 +843,7 @@
           <a:p>
             <a:fld id="{51B7D679-E93A-402E-ABAD-5AF933A0E160}" type="datetimeFigureOut">
               <a:rPr lang="en-US" smtClean="0"/>
-              <a:t>9/4/2018</a:t>
+              <a:t>9/5/2018</a:t>
             </a:fld>
             <a:endParaRPr lang="en-US"/>
           </a:p>
@@ -848,7 +854,7 @@
           <p:cNvPr id="5" name="Footer Placeholder 4">
             <a:extLst>
               <a:ext uri="{FF2B5EF4-FFF2-40B4-BE49-F238E27FC236}">
-                <a16:creationId xmlns:a16="http://schemas.microsoft.com/office/drawing/2014/main" id="{9BBBCCB8-7E96-461C-8AD4-E7E67BCEAAE5}"/>
+                <a16:creationId xmlns:a16="http://schemas.microsoft.com/office/drawing/2014/main" xmlns="" id="{9BBBCCB8-7E96-461C-8AD4-E7E67BCEAAE5}"/>
               </a:ext>
             </a:extLst>
           </p:cNvPr>
@@ -873,7 +879,7 @@
           <p:cNvPr id="6" name="Slide Number Placeholder 5">
             <a:extLst>
               <a:ext uri="{FF2B5EF4-FFF2-40B4-BE49-F238E27FC236}">
-                <a16:creationId xmlns:a16="http://schemas.microsoft.com/office/drawing/2014/main" id="{7BB243E6-B362-438C-8AA0-46E6A41E1A47}"/>
+                <a16:creationId xmlns:a16="http://schemas.microsoft.com/office/drawing/2014/main" xmlns="" id="{7BB243E6-B362-438C-8AA0-46E6A41E1A47}"/>
               </a:ext>
             </a:extLst>
           </p:cNvPr>
@@ -932,7 +938,7 @@
           <p:cNvPr id="2" name="Title 1">
             <a:extLst>
               <a:ext uri="{FF2B5EF4-FFF2-40B4-BE49-F238E27FC236}">
-                <a16:creationId xmlns:a16="http://schemas.microsoft.com/office/drawing/2014/main" id="{20A5091F-E293-42FC-812D-E28814AB6B28}"/>
+                <a16:creationId xmlns:a16="http://schemas.microsoft.com/office/drawing/2014/main" xmlns="" id="{20A5091F-E293-42FC-812D-E28814AB6B28}"/>
               </a:ext>
             </a:extLst>
           </p:cNvPr>
@@ -969,7 +975,7 @@
           <p:cNvPr id="3" name="Text Placeholder 2">
             <a:extLst>
               <a:ext uri="{FF2B5EF4-FFF2-40B4-BE49-F238E27FC236}">
-                <a16:creationId xmlns:a16="http://schemas.microsoft.com/office/drawing/2014/main" id="{20A17B00-E641-4BF0-8A8A-BEA59FB774EC}"/>
+                <a16:creationId xmlns:a16="http://schemas.microsoft.com/office/drawing/2014/main" xmlns="" id="{20A17B00-E641-4BF0-8A8A-BEA59FB774EC}"/>
               </a:ext>
             </a:extLst>
           </p:cNvPr>
@@ -1094,7 +1100,7 @@
           <p:cNvPr id="4" name="Date Placeholder 3">
             <a:extLst>
               <a:ext uri="{FF2B5EF4-FFF2-40B4-BE49-F238E27FC236}">
-                <a16:creationId xmlns:a16="http://schemas.microsoft.com/office/drawing/2014/main" id="{BC99A82E-D8F4-4183-8305-82A911191A39}"/>
+                <a16:creationId xmlns:a16="http://schemas.microsoft.com/office/drawing/2014/main" xmlns="" id="{BC99A82E-D8F4-4183-8305-82A911191A39}"/>
               </a:ext>
             </a:extLst>
           </p:cNvPr>
@@ -1112,7 +1118,7 @@
           <a:p>
             <a:fld id="{51B7D679-E93A-402E-ABAD-5AF933A0E160}" type="datetimeFigureOut">
               <a:rPr lang="en-US" smtClean="0"/>
-              <a:t>9/4/2018</a:t>
+              <a:t>9/5/2018</a:t>
             </a:fld>
             <a:endParaRPr lang="en-US"/>
           </a:p>
@@ -1123,7 +1129,7 @@
           <p:cNvPr id="5" name="Footer Placeholder 4">
             <a:extLst>
               <a:ext uri="{FF2B5EF4-FFF2-40B4-BE49-F238E27FC236}">
-                <a16:creationId xmlns:a16="http://schemas.microsoft.com/office/drawing/2014/main" id="{B8C863F6-9B67-4E50-B054-6E6A748E9DFB}"/>
+                <a16:creationId xmlns:a16="http://schemas.microsoft.com/office/drawing/2014/main" xmlns="" id="{B8C863F6-9B67-4E50-B054-6E6A748E9DFB}"/>
               </a:ext>
             </a:extLst>
           </p:cNvPr>
@@ -1148,7 +1154,7 @@
           <p:cNvPr id="6" name="Slide Number Placeholder 5">
             <a:extLst>
               <a:ext uri="{FF2B5EF4-FFF2-40B4-BE49-F238E27FC236}">
-                <a16:creationId xmlns:a16="http://schemas.microsoft.com/office/drawing/2014/main" id="{41D82EDA-9CE6-4371-8D94-11B024079253}"/>
+                <a16:creationId xmlns:a16="http://schemas.microsoft.com/office/drawing/2014/main" xmlns="" id="{41D82EDA-9CE6-4371-8D94-11B024079253}"/>
               </a:ext>
             </a:extLst>
           </p:cNvPr>
@@ -1207,7 +1213,7 @@
           <p:cNvPr id="2" name="Title 1">
             <a:extLst>
               <a:ext uri="{FF2B5EF4-FFF2-40B4-BE49-F238E27FC236}">
-                <a16:creationId xmlns:a16="http://schemas.microsoft.com/office/drawing/2014/main" id="{2905E9D3-E2FA-4435-AC82-E9A1CB61E547}"/>
+                <a16:creationId xmlns:a16="http://schemas.microsoft.com/office/drawing/2014/main" xmlns="" id="{2905E9D3-E2FA-4435-AC82-E9A1CB61E547}"/>
               </a:ext>
             </a:extLst>
           </p:cNvPr>
@@ -1235,7 +1241,7 @@
           <p:cNvPr id="3" name="Content Placeholder 2">
             <a:extLst>
               <a:ext uri="{FF2B5EF4-FFF2-40B4-BE49-F238E27FC236}">
-                <a16:creationId xmlns:a16="http://schemas.microsoft.com/office/drawing/2014/main" id="{FF11BD56-B040-4D78-A5A8-0FD59AEAACCF}"/>
+                <a16:creationId xmlns:a16="http://schemas.microsoft.com/office/drawing/2014/main" xmlns="" id="{FF11BD56-B040-4D78-A5A8-0FD59AEAACCF}"/>
               </a:ext>
             </a:extLst>
           </p:cNvPr>
@@ -1297,7 +1303,7 @@
           <p:cNvPr id="4" name="Content Placeholder 3">
             <a:extLst>
               <a:ext uri="{FF2B5EF4-FFF2-40B4-BE49-F238E27FC236}">
-                <a16:creationId xmlns:a16="http://schemas.microsoft.com/office/drawing/2014/main" id="{5D2AA8EB-C692-4274-B54F-A998806A4AC9}"/>
+                <a16:creationId xmlns:a16="http://schemas.microsoft.com/office/drawing/2014/main" xmlns="" id="{5D2AA8EB-C692-4274-B54F-A998806A4AC9}"/>
               </a:ext>
             </a:extLst>
           </p:cNvPr>
@@ -1359,7 +1365,7 @@
           <p:cNvPr id="5" name="Date Placeholder 4">
             <a:extLst>
               <a:ext uri="{FF2B5EF4-FFF2-40B4-BE49-F238E27FC236}">
-                <a16:creationId xmlns:a16="http://schemas.microsoft.com/office/drawing/2014/main" id="{0928336B-81BE-482C-98C0-0BAF6408C0DB}"/>
+                <a16:creationId xmlns:a16="http://schemas.microsoft.com/office/drawing/2014/main" xmlns="" id="{0928336B-81BE-482C-98C0-0BAF6408C0DB}"/>
               </a:ext>
             </a:extLst>
           </p:cNvPr>
@@ -1377,7 +1383,7 @@
           <a:p>
             <a:fld id="{51B7D679-E93A-402E-ABAD-5AF933A0E160}" type="datetimeFigureOut">
               <a:rPr lang="en-US" smtClean="0"/>
-              <a:t>9/4/2018</a:t>
+              <a:t>9/5/2018</a:t>
             </a:fld>
             <a:endParaRPr lang="en-US"/>
           </a:p>
@@ -1388,7 +1394,7 @@
           <p:cNvPr id="6" name="Footer Placeholder 5">
             <a:extLst>
               <a:ext uri="{FF2B5EF4-FFF2-40B4-BE49-F238E27FC236}">
-                <a16:creationId xmlns:a16="http://schemas.microsoft.com/office/drawing/2014/main" id="{726D55F4-A367-4303-80D5-72502BCCF2B2}"/>
+                <a16:creationId xmlns:a16="http://schemas.microsoft.com/office/drawing/2014/main" xmlns="" id="{726D55F4-A367-4303-80D5-72502BCCF2B2}"/>
               </a:ext>
             </a:extLst>
           </p:cNvPr>
@@ -1413,7 +1419,7 @@
           <p:cNvPr id="7" name="Slide Number Placeholder 6">
             <a:extLst>
               <a:ext uri="{FF2B5EF4-FFF2-40B4-BE49-F238E27FC236}">
-                <a16:creationId xmlns:a16="http://schemas.microsoft.com/office/drawing/2014/main" id="{FFBEFA7D-153C-44E8-B5D1-2BB0247C58E2}"/>
+                <a16:creationId xmlns:a16="http://schemas.microsoft.com/office/drawing/2014/main" xmlns="" id="{FFBEFA7D-153C-44E8-B5D1-2BB0247C58E2}"/>
               </a:ext>
             </a:extLst>
           </p:cNvPr>
@@ -1472,7 +1478,7 @@
           <p:cNvPr id="2" name="Title 1">
             <a:extLst>
               <a:ext uri="{FF2B5EF4-FFF2-40B4-BE49-F238E27FC236}">
-                <a16:creationId xmlns:a16="http://schemas.microsoft.com/office/drawing/2014/main" id="{FBFDC380-A936-43D0-9153-45A3FA7EA381}"/>
+                <a16:creationId xmlns:a16="http://schemas.microsoft.com/office/drawing/2014/main" xmlns="" id="{FBFDC380-A936-43D0-9153-45A3FA7EA381}"/>
               </a:ext>
             </a:extLst>
           </p:cNvPr>
@@ -1505,7 +1511,7 @@
           <p:cNvPr id="3" name="Text Placeholder 2">
             <a:extLst>
               <a:ext uri="{FF2B5EF4-FFF2-40B4-BE49-F238E27FC236}">
-                <a16:creationId xmlns:a16="http://schemas.microsoft.com/office/drawing/2014/main" id="{15E45444-8460-4654-BEBD-FE4AD42B902A}"/>
+                <a16:creationId xmlns:a16="http://schemas.microsoft.com/office/drawing/2014/main" xmlns="" id="{15E45444-8460-4654-BEBD-FE4AD42B902A}"/>
               </a:ext>
             </a:extLst>
           </p:cNvPr>
@@ -1576,7 +1582,7 @@
           <p:cNvPr id="4" name="Content Placeholder 3">
             <a:extLst>
               <a:ext uri="{FF2B5EF4-FFF2-40B4-BE49-F238E27FC236}">
-                <a16:creationId xmlns:a16="http://schemas.microsoft.com/office/drawing/2014/main" id="{EC9F6736-A645-4BA6-96EB-1DECA1880A59}"/>
+                <a16:creationId xmlns:a16="http://schemas.microsoft.com/office/drawing/2014/main" xmlns="" id="{EC9F6736-A645-4BA6-96EB-1DECA1880A59}"/>
               </a:ext>
             </a:extLst>
           </p:cNvPr>
@@ -1638,7 +1644,7 @@
           <p:cNvPr id="5" name="Text Placeholder 4">
             <a:extLst>
               <a:ext uri="{FF2B5EF4-FFF2-40B4-BE49-F238E27FC236}">
-                <a16:creationId xmlns:a16="http://schemas.microsoft.com/office/drawing/2014/main" id="{88A80E41-BEE3-495A-855D-8729F6820975}"/>
+                <a16:creationId xmlns:a16="http://schemas.microsoft.com/office/drawing/2014/main" xmlns="" id="{88A80E41-BEE3-495A-855D-8729F6820975}"/>
               </a:ext>
             </a:extLst>
           </p:cNvPr>
@@ -1709,7 +1715,7 @@
           <p:cNvPr id="6" name="Content Placeholder 5">
             <a:extLst>
               <a:ext uri="{FF2B5EF4-FFF2-40B4-BE49-F238E27FC236}">
-                <a16:creationId xmlns:a16="http://schemas.microsoft.com/office/drawing/2014/main" id="{9612806C-7C64-4356-B7FC-D563BD152CDB}"/>
+                <a16:creationId xmlns:a16="http://schemas.microsoft.com/office/drawing/2014/main" xmlns="" id="{9612806C-7C64-4356-B7FC-D563BD152CDB}"/>
               </a:ext>
             </a:extLst>
           </p:cNvPr>
@@ -1771,7 +1777,7 @@
           <p:cNvPr id="7" name="Date Placeholder 6">
             <a:extLst>
               <a:ext uri="{FF2B5EF4-FFF2-40B4-BE49-F238E27FC236}">
-                <a16:creationId xmlns:a16="http://schemas.microsoft.com/office/drawing/2014/main" id="{8C126FBC-7AD5-4875-B899-B75D4717BA85}"/>
+                <a16:creationId xmlns:a16="http://schemas.microsoft.com/office/drawing/2014/main" xmlns="" id="{8C126FBC-7AD5-4875-B899-B75D4717BA85}"/>
               </a:ext>
             </a:extLst>
           </p:cNvPr>
@@ -1789,7 +1795,7 @@
           <a:p>
             <a:fld id="{51B7D679-E93A-402E-ABAD-5AF933A0E160}" type="datetimeFigureOut">
               <a:rPr lang="en-US" smtClean="0"/>
-              <a:t>9/4/2018</a:t>
+              <a:t>9/5/2018</a:t>
             </a:fld>
             <a:endParaRPr lang="en-US"/>
           </a:p>
@@ -1800,7 +1806,7 @@
           <p:cNvPr id="8" name="Footer Placeholder 7">
             <a:extLst>
               <a:ext uri="{FF2B5EF4-FFF2-40B4-BE49-F238E27FC236}">
-                <a16:creationId xmlns:a16="http://schemas.microsoft.com/office/drawing/2014/main" id="{FFBDAEBC-ECA7-48A3-82EC-ED91F7979129}"/>
+                <a16:creationId xmlns:a16="http://schemas.microsoft.com/office/drawing/2014/main" xmlns="" id="{FFBDAEBC-ECA7-48A3-82EC-ED91F7979129}"/>
               </a:ext>
             </a:extLst>
           </p:cNvPr>
@@ -1825,7 +1831,7 @@
           <p:cNvPr id="9" name="Slide Number Placeholder 8">
             <a:extLst>
               <a:ext uri="{FF2B5EF4-FFF2-40B4-BE49-F238E27FC236}">
-                <a16:creationId xmlns:a16="http://schemas.microsoft.com/office/drawing/2014/main" id="{1D946DC7-1E4B-4A64-A1A7-4ACC684215F0}"/>
+                <a16:creationId xmlns:a16="http://schemas.microsoft.com/office/drawing/2014/main" xmlns="" id="{1D946DC7-1E4B-4A64-A1A7-4ACC684215F0}"/>
               </a:ext>
             </a:extLst>
           </p:cNvPr>
@@ -1884,7 +1890,7 @@
           <p:cNvPr id="2" name="Title 1">
             <a:extLst>
               <a:ext uri="{FF2B5EF4-FFF2-40B4-BE49-F238E27FC236}">
-                <a16:creationId xmlns:a16="http://schemas.microsoft.com/office/drawing/2014/main" id="{402C7499-A021-40D9-A248-913176A0E452}"/>
+                <a16:creationId xmlns:a16="http://schemas.microsoft.com/office/drawing/2014/main" xmlns="" id="{402C7499-A021-40D9-A248-913176A0E452}"/>
               </a:ext>
             </a:extLst>
           </p:cNvPr>
@@ -1912,7 +1918,7 @@
           <p:cNvPr id="3" name="Date Placeholder 2">
             <a:extLst>
               <a:ext uri="{FF2B5EF4-FFF2-40B4-BE49-F238E27FC236}">
-                <a16:creationId xmlns:a16="http://schemas.microsoft.com/office/drawing/2014/main" id="{6CEE2793-93CD-4304-8C52-BF67A8764471}"/>
+                <a16:creationId xmlns:a16="http://schemas.microsoft.com/office/drawing/2014/main" xmlns="" id="{6CEE2793-93CD-4304-8C52-BF67A8764471}"/>
               </a:ext>
             </a:extLst>
           </p:cNvPr>
@@ -1930,7 +1936,7 @@
           <a:p>
             <a:fld id="{51B7D679-E93A-402E-ABAD-5AF933A0E160}" type="datetimeFigureOut">
               <a:rPr lang="en-US" smtClean="0"/>
-              <a:t>9/4/2018</a:t>
+              <a:t>9/5/2018</a:t>
             </a:fld>
             <a:endParaRPr lang="en-US"/>
           </a:p>
@@ -1941,7 +1947,7 @@
           <p:cNvPr id="4" name="Footer Placeholder 3">
             <a:extLst>
               <a:ext uri="{FF2B5EF4-FFF2-40B4-BE49-F238E27FC236}">
-                <a16:creationId xmlns:a16="http://schemas.microsoft.com/office/drawing/2014/main" id="{BE78A432-8488-4C61-B96D-419037B23A4A}"/>
+                <a16:creationId xmlns:a16="http://schemas.microsoft.com/office/drawing/2014/main" xmlns="" id="{BE78A432-8488-4C61-B96D-419037B23A4A}"/>
               </a:ext>
             </a:extLst>
           </p:cNvPr>
@@ -1966,7 +1972,7 @@
           <p:cNvPr id="5" name="Slide Number Placeholder 4">
             <a:extLst>
               <a:ext uri="{FF2B5EF4-FFF2-40B4-BE49-F238E27FC236}">
-                <a16:creationId xmlns:a16="http://schemas.microsoft.com/office/drawing/2014/main" id="{817D17E4-BE7E-4EFA-AA9E-E764893F8A46}"/>
+                <a16:creationId xmlns:a16="http://schemas.microsoft.com/office/drawing/2014/main" xmlns="" id="{817D17E4-BE7E-4EFA-AA9E-E764893F8A46}"/>
               </a:ext>
             </a:extLst>
           </p:cNvPr>
@@ -2025,7 +2031,7 @@
           <p:cNvPr id="2" name="Date Placeholder 1">
             <a:extLst>
               <a:ext uri="{FF2B5EF4-FFF2-40B4-BE49-F238E27FC236}">
-                <a16:creationId xmlns:a16="http://schemas.microsoft.com/office/drawing/2014/main" id="{19EA9315-D525-4EE9-AC9D-C4ACE9A865DB}"/>
+                <a16:creationId xmlns:a16="http://schemas.microsoft.com/office/drawing/2014/main" xmlns="" id="{19EA9315-D525-4EE9-AC9D-C4ACE9A865DB}"/>
               </a:ext>
             </a:extLst>
           </p:cNvPr>
@@ -2043,7 +2049,7 @@
           <a:p>
             <a:fld id="{51B7D679-E93A-402E-ABAD-5AF933A0E160}" type="datetimeFigureOut">
               <a:rPr lang="en-US" smtClean="0"/>
-              <a:t>9/4/2018</a:t>
+              <a:t>9/5/2018</a:t>
             </a:fld>
             <a:endParaRPr lang="en-US"/>
           </a:p>
@@ -2054,7 +2060,7 @@
           <p:cNvPr id="3" name="Footer Placeholder 2">
             <a:extLst>
               <a:ext uri="{FF2B5EF4-FFF2-40B4-BE49-F238E27FC236}">
-                <a16:creationId xmlns:a16="http://schemas.microsoft.com/office/drawing/2014/main" id="{EB1B3673-5FB4-46B4-81CB-A5A9E1F65500}"/>
+                <a16:creationId xmlns:a16="http://schemas.microsoft.com/office/drawing/2014/main" xmlns="" id="{EB1B3673-5FB4-46B4-81CB-A5A9E1F65500}"/>
               </a:ext>
             </a:extLst>
           </p:cNvPr>
@@ -2079,7 +2085,7 @@
           <p:cNvPr id="4" name="Slide Number Placeholder 3">
             <a:extLst>
               <a:ext uri="{FF2B5EF4-FFF2-40B4-BE49-F238E27FC236}">
-                <a16:creationId xmlns:a16="http://schemas.microsoft.com/office/drawing/2014/main" id="{CCCB83A0-E0EC-4E69-954B-4B9F7791A554}"/>
+                <a16:creationId xmlns:a16="http://schemas.microsoft.com/office/drawing/2014/main" xmlns="" id="{CCCB83A0-E0EC-4E69-954B-4B9F7791A554}"/>
               </a:ext>
             </a:extLst>
           </p:cNvPr>
@@ -2138,7 +2144,7 @@
           <p:cNvPr id="2" name="Title 1">
             <a:extLst>
               <a:ext uri="{FF2B5EF4-FFF2-40B4-BE49-F238E27FC236}">
-                <a16:creationId xmlns:a16="http://schemas.microsoft.com/office/drawing/2014/main" id="{1E449ED0-6C05-4208-BAC6-1B72DDE6FD1C}"/>
+                <a16:creationId xmlns:a16="http://schemas.microsoft.com/office/drawing/2014/main" xmlns="" id="{1E449ED0-6C05-4208-BAC6-1B72DDE6FD1C}"/>
               </a:ext>
             </a:extLst>
           </p:cNvPr>
@@ -2175,7 +2181,7 @@
           <p:cNvPr id="3" name="Content Placeholder 2">
             <a:extLst>
               <a:ext uri="{FF2B5EF4-FFF2-40B4-BE49-F238E27FC236}">
-                <a16:creationId xmlns:a16="http://schemas.microsoft.com/office/drawing/2014/main" id="{56204A91-27C6-4A2E-97BE-129994C65E7F}"/>
+                <a16:creationId xmlns:a16="http://schemas.microsoft.com/office/drawing/2014/main" xmlns="" id="{56204A91-27C6-4A2E-97BE-129994C65E7F}"/>
               </a:ext>
             </a:extLst>
           </p:cNvPr>
@@ -2265,7 +2271,7 @@
           <p:cNvPr id="4" name="Text Placeholder 3">
             <a:extLst>
               <a:ext uri="{FF2B5EF4-FFF2-40B4-BE49-F238E27FC236}">
-                <a16:creationId xmlns:a16="http://schemas.microsoft.com/office/drawing/2014/main" id="{8AFAB156-F18D-40A5-A411-B2920BE02C73}"/>
+                <a16:creationId xmlns:a16="http://schemas.microsoft.com/office/drawing/2014/main" xmlns="" id="{8AFAB156-F18D-40A5-A411-B2920BE02C73}"/>
               </a:ext>
             </a:extLst>
           </p:cNvPr>
@@ -2336,7 +2342,7 @@
           <p:cNvPr id="5" name="Date Placeholder 4">
             <a:extLst>
               <a:ext uri="{FF2B5EF4-FFF2-40B4-BE49-F238E27FC236}">
-                <a16:creationId xmlns:a16="http://schemas.microsoft.com/office/drawing/2014/main" id="{39231546-0AE5-48DB-9327-C88F34C532A0}"/>
+                <a16:creationId xmlns:a16="http://schemas.microsoft.com/office/drawing/2014/main" xmlns="" id="{39231546-0AE5-48DB-9327-C88F34C532A0}"/>
               </a:ext>
             </a:extLst>
           </p:cNvPr>
@@ -2354,7 +2360,7 @@
           <a:p>
             <a:fld id="{51B7D679-E93A-402E-ABAD-5AF933A0E160}" type="datetimeFigureOut">
               <a:rPr lang="en-US" smtClean="0"/>
-              <a:t>9/4/2018</a:t>
+              <a:t>9/5/2018</a:t>
             </a:fld>
             <a:endParaRPr lang="en-US"/>
           </a:p>
@@ -2365,7 +2371,7 @@
           <p:cNvPr id="6" name="Footer Placeholder 5">
             <a:extLst>
               <a:ext uri="{FF2B5EF4-FFF2-40B4-BE49-F238E27FC236}">
-                <a16:creationId xmlns:a16="http://schemas.microsoft.com/office/drawing/2014/main" id="{22933D85-DB47-4162-B276-E24387F64B64}"/>
+                <a16:creationId xmlns:a16="http://schemas.microsoft.com/office/drawing/2014/main" xmlns="" id="{22933D85-DB47-4162-B276-E24387F64B64}"/>
               </a:ext>
             </a:extLst>
           </p:cNvPr>
@@ -2390,7 +2396,7 @@
           <p:cNvPr id="7" name="Slide Number Placeholder 6">
             <a:extLst>
               <a:ext uri="{FF2B5EF4-FFF2-40B4-BE49-F238E27FC236}">
-                <a16:creationId xmlns:a16="http://schemas.microsoft.com/office/drawing/2014/main" id="{63A96901-B7DD-438E-B174-08FEC9E7FAF4}"/>
+                <a16:creationId xmlns:a16="http://schemas.microsoft.com/office/drawing/2014/main" xmlns="" id="{63A96901-B7DD-438E-B174-08FEC9E7FAF4}"/>
               </a:ext>
             </a:extLst>
           </p:cNvPr>
@@ -2449,7 +2455,7 @@
           <p:cNvPr id="2" name="Title 1">
             <a:extLst>
               <a:ext uri="{FF2B5EF4-FFF2-40B4-BE49-F238E27FC236}">
-                <a16:creationId xmlns:a16="http://schemas.microsoft.com/office/drawing/2014/main" id="{07265CD1-B7AD-42CE-AB2F-5410DD493AEA}"/>
+                <a16:creationId xmlns:a16="http://schemas.microsoft.com/office/drawing/2014/main" xmlns="" id="{07265CD1-B7AD-42CE-AB2F-5410DD493AEA}"/>
               </a:ext>
             </a:extLst>
           </p:cNvPr>
@@ -2486,7 +2492,7 @@
           <p:cNvPr id="3" name="Picture Placeholder 2">
             <a:extLst>
               <a:ext uri="{FF2B5EF4-FFF2-40B4-BE49-F238E27FC236}">
-                <a16:creationId xmlns:a16="http://schemas.microsoft.com/office/drawing/2014/main" id="{AA670EAD-B4FF-40ED-9933-6BE90BB4F05E}"/>
+                <a16:creationId xmlns:a16="http://schemas.microsoft.com/office/drawing/2014/main" xmlns="" id="{AA670EAD-B4FF-40ED-9933-6BE90BB4F05E}"/>
               </a:ext>
             </a:extLst>
           </p:cNvPr>
@@ -2553,7 +2559,7 @@
           <p:cNvPr id="4" name="Text Placeholder 3">
             <a:extLst>
               <a:ext uri="{FF2B5EF4-FFF2-40B4-BE49-F238E27FC236}">
-                <a16:creationId xmlns:a16="http://schemas.microsoft.com/office/drawing/2014/main" id="{74ADEC53-8688-4956-90A4-963CE494B1ED}"/>
+                <a16:creationId xmlns:a16="http://schemas.microsoft.com/office/drawing/2014/main" xmlns="" id="{74ADEC53-8688-4956-90A4-963CE494B1ED}"/>
               </a:ext>
             </a:extLst>
           </p:cNvPr>
@@ -2624,7 +2630,7 @@
           <p:cNvPr id="5" name="Date Placeholder 4">
             <a:extLst>
               <a:ext uri="{FF2B5EF4-FFF2-40B4-BE49-F238E27FC236}">
-                <a16:creationId xmlns:a16="http://schemas.microsoft.com/office/drawing/2014/main" id="{F0119989-1665-400F-9C48-929DB865B53A}"/>
+                <a16:creationId xmlns:a16="http://schemas.microsoft.com/office/drawing/2014/main" xmlns="" id="{F0119989-1665-400F-9C48-929DB865B53A}"/>
               </a:ext>
             </a:extLst>
           </p:cNvPr>
@@ -2642,7 +2648,7 @@
           <a:p>
             <a:fld id="{51B7D679-E93A-402E-ABAD-5AF933A0E160}" type="datetimeFigureOut">
               <a:rPr lang="en-US" smtClean="0"/>
-              <a:t>9/4/2018</a:t>
+              <a:t>9/5/2018</a:t>
             </a:fld>
             <a:endParaRPr lang="en-US"/>
           </a:p>
@@ -2653,7 +2659,7 @@
           <p:cNvPr id="6" name="Footer Placeholder 5">
             <a:extLst>
               <a:ext uri="{FF2B5EF4-FFF2-40B4-BE49-F238E27FC236}">
-                <a16:creationId xmlns:a16="http://schemas.microsoft.com/office/drawing/2014/main" id="{D972822A-402F-4694-B0E5-EBD5128313DF}"/>
+                <a16:creationId xmlns:a16="http://schemas.microsoft.com/office/drawing/2014/main" xmlns="" id="{D972822A-402F-4694-B0E5-EBD5128313DF}"/>
               </a:ext>
             </a:extLst>
           </p:cNvPr>
@@ -2678,7 +2684,7 @@
           <p:cNvPr id="7" name="Slide Number Placeholder 6">
             <a:extLst>
               <a:ext uri="{FF2B5EF4-FFF2-40B4-BE49-F238E27FC236}">
-                <a16:creationId xmlns:a16="http://schemas.microsoft.com/office/drawing/2014/main" id="{2C3BAAEA-38E3-465D-9E40-D93E337D882E}"/>
+                <a16:creationId xmlns:a16="http://schemas.microsoft.com/office/drawing/2014/main" xmlns="" id="{2C3BAAEA-38E3-465D-9E40-D93E337D882E}"/>
               </a:ext>
             </a:extLst>
           </p:cNvPr>
@@ -2748,7 +2754,7 @@
           <p:cNvPr id="2" name="Title Placeholder 1">
             <a:extLst>
               <a:ext uri="{FF2B5EF4-FFF2-40B4-BE49-F238E27FC236}">
-                <a16:creationId xmlns:a16="http://schemas.microsoft.com/office/drawing/2014/main" id="{96F126FC-14EB-4107-9243-F0D3AB28CA69}"/>
+                <a16:creationId xmlns:a16="http://schemas.microsoft.com/office/drawing/2014/main" xmlns="" id="{96F126FC-14EB-4107-9243-F0D3AB28CA69}"/>
               </a:ext>
             </a:extLst>
           </p:cNvPr>
@@ -2786,7 +2792,7 @@
           <p:cNvPr id="3" name="Text Placeholder 2">
             <a:extLst>
               <a:ext uri="{FF2B5EF4-FFF2-40B4-BE49-F238E27FC236}">
-                <a16:creationId xmlns:a16="http://schemas.microsoft.com/office/drawing/2014/main" id="{2B94F23D-353B-437E-8B65-D69036D62D03}"/>
+                <a16:creationId xmlns:a16="http://schemas.microsoft.com/office/drawing/2014/main" xmlns="" id="{2B94F23D-353B-437E-8B65-D69036D62D03}"/>
               </a:ext>
             </a:extLst>
           </p:cNvPr>
@@ -2853,7 +2859,7 @@
           <p:cNvPr id="4" name="Date Placeholder 3">
             <a:extLst>
               <a:ext uri="{FF2B5EF4-FFF2-40B4-BE49-F238E27FC236}">
-                <a16:creationId xmlns:a16="http://schemas.microsoft.com/office/drawing/2014/main" id="{BA44C157-9582-4CC8-9779-B70D10F12838}"/>
+                <a16:creationId xmlns:a16="http://schemas.microsoft.com/office/drawing/2014/main" xmlns="" id="{BA44C157-9582-4CC8-9779-B70D10F12838}"/>
               </a:ext>
             </a:extLst>
           </p:cNvPr>
@@ -2889,7 +2895,7 @@
           <a:p>
             <a:fld id="{51B7D679-E93A-402E-ABAD-5AF933A0E160}" type="datetimeFigureOut">
               <a:rPr lang="en-US" smtClean="0"/>
-              <a:t>9/4/2018</a:t>
+              <a:t>9/5/2018</a:t>
             </a:fld>
             <a:endParaRPr lang="en-US"/>
           </a:p>
@@ -2900,7 +2906,7 @@
           <p:cNvPr id="5" name="Footer Placeholder 4">
             <a:extLst>
               <a:ext uri="{FF2B5EF4-FFF2-40B4-BE49-F238E27FC236}">
-                <a16:creationId xmlns:a16="http://schemas.microsoft.com/office/drawing/2014/main" id="{4D3364CE-6873-4522-A2E2-62A4707E2002}"/>
+                <a16:creationId xmlns:a16="http://schemas.microsoft.com/office/drawing/2014/main" xmlns="" id="{4D3364CE-6873-4522-A2E2-62A4707E2002}"/>
               </a:ext>
             </a:extLst>
           </p:cNvPr>
@@ -2943,7 +2949,7 @@
           <p:cNvPr id="6" name="Slide Number Placeholder 5">
             <a:extLst>
               <a:ext uri="{FF2B5EF4-FFF2-40B4-BE49-F238E27FC236}">
-                <a16:creationId xmlns:a16="http://schemas.microsoft.com/office/drawing/2014/main" id="{76389A63-33FA-4FF6-B9A6-41182EFC322E}"/>
+                <a16:creationId xmlns:a16="http://schemas.microsoft.com/office/drawing/2014/main" xmlns="" id="{76389A63-33FA-4FF6-B9A6-41182EFC322E}"/>
               </a:ext>
             </a:extLst>
           </p:cNvPr>
@@ -3323,7 +3329,7 @@
           <p:cNvPr id="2" name="Title 1">
             <a:extLst>
               <a:ext uri="{FF2B5EF4-FFF2-40B4-BE49-F238E27FC236}">
-                <a16:creationId xmlns:a16="http://schemas.microsoft.com/office/drawing/2014/main" id="{898AD1DB-B505-414F-A99D-08B60A32B917}"/>
+                <a16:creationId xmlns:a16="http://schemas.microsoft.com/office/drawing/2014/main" xmlns="" id="{898AD1DB-B505-414F-A99D-08B60A32B917}"/>
               </a:ext>
             </a:extLst>
           </p:cNvPr>
@@ -3339,7 +3345,11 @@
           <a:bodyPr/>
           <a:lstStyle/>
           <a:p>
-            <a:endParaRPr lang="en-US"/>
+            <a:r>
+              <a:rPr lang="en-US" dirty="0" smtClean="0"/>
+              <a:t>Day 2</a:t>
+            </a:r>
+            <a:endParaRPr lang="en-US" dirty="0"/>
           </a:p>
         </p:txBody>
       </p:sp>
@@ -3348,7 +3358,7 @@
           <p:cNvPr id="3" name="Subtitle 2">
             <a:extLst>
               <a:ext uri="{FF2B5EF4-FFF2-40B4-BE49-F238E27FC236}">
-                <a16:creationId xmlns:a16="http://schemas.microsoft.com/office/drawing/2014/main" id="{DD7E5672-7F5F-45E1-97B4-FE9C82A6373B}"/>
+                <a16:creationId xmlns:a16="http://schemas.microsoft.com/office/drawing/2014/main" xmlns="" id="{DD7E5672-7F5F-45E1-97B4-FE9C82A6373B}"/>
               </a:ext>
             </a:extLst>
           </p:cNvPr>
@@ -3361,10 +3371,41 @@
         </p:nvSpPr>
         <p:spPr/>
         <p:txBody>
-          <a:bodyPr/>
-          <a:lstStyle/>
-          <a:p>
-            <a:endParaRPr lang="en-US"/>
+          <a:bodyPr>
+            <a:normAutofit fontScale="77500" lnSpcReduction="20000"/>
+          </a:bodyPr>
+          <a:lstStyle/>
+          <a:p>
+            <a:r>
+              <a:rPr lang="en-US" dirty="0" smtClean="0"/>
+              <a:t>Review</a:t>
+            </a:r>
+          </a:p>
+          <a:p>
+            <a:r>
+              <a:rPr lang="en-US" dirty="0" smtClean="0"/>
+              <a:t>Logic</a:t>
+            </a:r>
+          </a:p>
+          <a:p>
+            <a:r>
+              <a:rPr lang="en-US" dirty="0" err="1" smtClean="0"/>
+              <a:t>Subsetting</a:t>
+            </a:r>
+            <a:endParaRPr lang="en-US" dirty="0" smtClean="0"/>
+          </a:p>
+          <a:p>
+            <a:r>
+              <a:rPr lang="en-US" dirty="0" smtClean="0"/>
+              <a:t>Control statements</a:t>
+            </a:r>
+          </a:p>
+          <a:p>
+            <a:r>
+              <a:rPr lang="en-US" dirty="0" smtClean="0"/>
+              <a:t>Functions</a:t>
+            </a:r>
+            <a:endParaRPr lang="en-US" dirty="0"/>
           </a:p>
         </p:txBody>
       </p:sp>
@@ -3400,13 +3441,7 @@
       </p:grpSpPr>
       <p:sp>
         <p:nvSpPr>
-          <p:cNvPr id="2" name="Title 1">
-            <a:extLst>
-              <a:ext uri="{FF2B5EF4-FFF2-40B4-BE49-F238E27FC236}">
-                <a16:creationId xmlns:a16="http://schemas.microsoft.com/office/drawing/2014/main" id="{803F8943-A215-48C1-8774-983C39282DD9}"/>
-              </a:ext>
-            </a:extLst>
-          </p:cNvPr>
+          <p:cNvPr id="2" name="Title 1"/>
           <p:cNvSpPr>
             <a:spLocks noGrp="1"/>
           </p:cNvSpPr>
@@ -3419,22 +3454,13 @@
           <a:bodyPr/>
           <a:lstStyle/>
           <a:p>
-            <a:r>
-              <a:rPr lang="en-US" dirty="0"/>
-              <a:t>Review</a:t>
-            </a:r>
-          </a:p>
-        </p:txBody>
-      </p:sp>
-      <p:sp>
-        <p:nvSpPr>
-          <p:cNvPr id="3" name="Content Placeholder 2">
-            <a:extLst>
-              <a:ext uri="{FF2B5EF4-FFF2-40B4-BE49-F238E27FC236}">
-                <a16:creationId xmlns:a16="http://schemas.microsoft.com/office/drawing/2014/main" id="{06058832-8E48-4073-B626-8517B6C4480D}"/>
-              </a:ext>
-            </a:extLst>
-          </p:cNvPr>
+            <a:endParaRPr lang="en-US" dirty="0"/>
+          </a:p>
+        </p:txBody>
+      </p:sp>
+      <p:sp>
+        <p:nvSpPr>
+          <p:cNvPr id="3" name="Content Placeholder 2"/>
           <p:cNvSpPr>
             <a:spLocks noGrp="1"/>
           </p:cNvSpPr>
@@ -3444,65 +3470,92 @@
         </p:nvSpPr>
         <p:spPr/>
         <p:txBody>
-          <a:bodyPr>
-            <a:normAutofit lnSpcReduction="10000"/>
-          </a:bodyPr>
-          <a:lstStyle/>
-          <a:p>
-            <a:r>
-              <a:rPr lang="pt-BR" sz="2400" dirty="0"/>
-              <a:t>&gt; str(x)</a:t>
-            </a:r>
-          </a:p>
-          <a:p>
-            <a:r>
-              <a:rPr lang="pt-BR" sz="2400" dirty="0"/>
-              <a:t> num [1:10] 0.1915 -0.0752 1.1338 0.1354 -2.2114 ...</a:t>
-            </a:r>
+          <a:bodyPr/>
+          <a:lstStyle/>
+          <a:p>
+            <a:r>
+              <a:rPr lang="en-US" dirty="0" smtClean="0"/>
+              <a:t>Logic</a:t>
+            </a:r>
+          </a:p>
+          <a:p>
+            <a:pPr marL="457200" indent="-457200">
+              <a:buFont typeface="Arial" panose="020B0604020202020204" pitchFamily="34" charset="0"/>
+              <a:buChar char="•"/>
+            </a:pPr>
+            <a:r>
+              <a:rPr lang="en-US" sz="2000" dirty="0" smtClean="0"/>
+              <a:t>Test equality of values, test structure of objects</a:t>
+            </a:r>
+          </a:p>
+          <a:p>
+            <a:pPr marL="457200" indent="-457200">
+              <a:buFont typeface="Arial" panose="020B0604020202020204" pitchFamily="34" charset="0"/>
+              <a:buChar char="•"/>
+            </a:pPr>
+            <a:r>
+              <a:rPr lang="en-US" sz="2000" b="1" dirty="0" smtClean="0"/>
+              <a:t>Prove that things are the way you want them to be</a:t>
+            </a:r>
+          </a:p>
+          <a:p>
+            <a:pPr marL="457200" indent="-457200">
+              <a:buFont typeface="Arial" panose="020B0604020202020204" pitchFamily="34" charset="0"/>
+              <a:buChar char="•"/>
+            </a:pPr>
+            <a:endParaRPr lang="en-US" sz="2000" b="1" dirty="0"/>
+          </a:p>
+          <a:p>
+            <a:r>
+              <a:rPr lang="en-US" b="1" dirty="0" err="1" smtClean="0"/>
+              <a:t>Subsetting</a:t>
+            </a:r>
+            <a:endParaRPr lang="en-US" b="1" dirty="0" smtClean="0"/>
+          </a:p>
+          <a:p>
+            <a:pPr marL="342900" indent="-342900">
+              <a:buFont typeface="Arial" panose="020B0604020202020204" pitchFamily="34" charset="0"/>
+              <a:buChar char="•"/>
+            </a:pPr>
+            <a:r>
+              <a:rPr lang="en-US" sz="2400" dirty="0" smtClean="0"/>
+              <a:t>May use integer </a:t>
+            </a:r>
+            <a:r>
+              <a:rPr lang="en-US" sz="2400" b="1" dirty="0" smtClean="0"/>
+              <a:t>or</a:t>
+            </a:r>
+            <a:r>
+              <a:rPr lang="en-US" sz="2400" dirty="0" smtClean="0"/>
+              <a:t> logical indices</a:t>
+            </a:r>
+          </a:p>
+          <a:p>
             <a:endParaRPr lang="en-US" sz="2400" dirty="0"/>
           </a:p>
           <a:p>
+            <a:r>
+              <a:rPr lang="en-US" dirty="0" smtClean="0"/>
+              <a:t>Control flow statements</a:t>
+            </a:r>
+          </a:p>
+          <a:p>
+            <a:pPr marL="342900" indent="-342900">
+              <a:buFont typeface="Arial" panose="020B0604020202020204" pitchFamily="34" charset="0"/>
+              <a:buChar char="•"/>
+            </a:pPr>
+            <a:r>
+              <a:rPr lang="en-US" sz="2400" smtClean="0"/>
+              <a:t>Program things</a:t>
+            </a:r>
             <a:endParaRPr lang="en-US" sz="2400" dirty="0"/>
-          </a:p>
-          <a:p>
-            <a:r>
-              <a:rPr lang="en-US" sz="2400" dirty="0"/>
-              <a:t>str( mean(x) )</a:t>
-            </a:r>
-          </a:p>
-          <a:p>
-            <a:endParaRPr lang="en-US" sz="2400" dirty="0"/>
-          </a:p>
-          <a:p>
-            <a:r>
-              <a:rPr lang="en-US" sz="2400" dirty="0"/>
-              <a:t>x[1:5]</a:t>
-            </a:r>
-          </a:p>
-          <a:p>
-            <a:endParaRPr lang="en-US" sz="2400" dirty="0"/>
-          </a:p>
-          <a:p>
-            <a:r>
-              <a:rPr lang="en-US" sz="2400" dirty="0"/>
-              <a:t>tail(x)</a:t>
-            </a:r>
-          </a:p>
-          <a:p>
-            <a:endParaRPr lang="en-US" sz="2400" dirty="0"/>
-          </a:p>
-          <a:p>
-            <a:r>
-              <a:rPr lang="en-US" sz="2400" dirty="0"/>
-              <a:t> </a:t>
-            </a:r>
           </a:p>
         </p:txBody>
       </p:sp>
     </p:spTree>
     <p:extLst>
       <p:ext uri="{BB962C8B-B14F-4D97-AF65-F5344CB8AC3E}">
-        <p14:creationId xmlns:p14="http://schemas.microsoft.com/office/powerpoint/2010/main" val="2676337257"/>
+        <p14:creationId xmlns:p14="http://schemas.microsoft.com/office/powerpoint/2010/main" val="914681289"/>
       </p:ext>
     </p:extLst>
   </p:cSld>
@@ -3534,7 +3587,7 @@
           <p:cNvPr id="2" name="Title 1">
             <a:extLst>
               <a:ext uri="{FF2B5EF4-FFF2-40B4-BE49-F238E27FC236}">
-                <a16:creationId xmlns:a16="http://schemas.microsoft.com/office/drawing/2014/main" id="{803F8943-A215-48C1-8774-983C39282DD9}"/>
+                <a16:creationId xmlns:a16="http://schemas.microsoft.com/office/drawing/2014/main" xmlns="" id="{803F8943-A215-48C1-8774-983C39282DD9}"/>
               </a:ext>
             </a:extLst>
           </p:cNvPr>
@@ -3562,7 +3615,7 @@
           <p:cNvPr id="3" name="Content Placeholder 2">
             <a:extLst>
               <a:ext uri="{FF2B5EF4-FFF2-40B4-BE49-F238E27FC236}">
-                <a16:creationId xmlns:a16="http://schemas.microsoft.com/office/drawing/2014/main" id="{06058832-8E48-4073-B626-8517B6C4480D}"/>
+                <a16:creationId xmlns:a16="http://schemas.microsoft.com/office/drawing/2014/main" xmlns="" id="{06058832-8E48-4073-B626-8517B6C4480D}"/>
               </a:ext>
             </a:extLst>
           </p:cNvPr>
@@ -3588,25 +3641,17 @@
           <a:p>
             <a:r>
               <a:rPr lang="pt-BR" sz="2400" dirty="0"/>
-              <a:t>  num [1:10, 1:10] 1.204 -0.891 0.229 -1.639 -0.955 ...</a:t>
-            </a:r>
-          </a:p>
-          <a:p>
-            <a:endParaRPr lang="pt-BR" sz="2400" dirty="0"/>
-          </a:p>
-          <a:p>
-            <a:r>
-              <a:rPr lang="pt-BR" sz="2400" dirty="0"/>
-              <a:t>mean(x)</a:t>
-            </a:r>
-          </a:p>
-          <a:p>
+              <a:t> num [1:10] 0.1915 -0.0752 1.1338 0.1354 -2.2114 ...</a:t>
+            </a:r>
             <a:endParaRPr lang="en-US" sz="2400" dirty="0"/>
           </a:p>
           <a:p>
+            <a:endParaRPr lang="en-US" sz="2400" dirty="0"/>
+          </a:p>
+          <a:p>
             <a:r>
               <a:rPr lang="en-US" sz="2400" dirty="0"/>
-              <a:t>X[1:4, 1:4]</a:t>
+              <a:t>str( mean(x) )</a:t>
             </a:r>
           </a:p>
           <a:p>
@@ -3615,7 +3660,7 @@
           <a:p>
             <a:r>
               <a:rPr lang="en-US" sz="2400" dirty="0"/>
-              <a:t>x^2</a:t>
+              <a:t>x[1:5]</a:t>
             </a:r>
           </a:p>
           <a:p>
@@ -3624,7 +3669,16 @@
           <a:p>
             <a:r>
               <a:rPr lang="en-US" sz="2400" dirty="0"/>
-              <a:t>x+1</a:t>
+              <a:t>tail(x)</a:t>
+            </a:r>
+          </a:p>
+          <a:p>
+            <a:endParaRPr lang="en-US" sz="2400" dirty="0"/>
+          </a:p>
+          <a:p>
+            <a:r>
+              <a:rPr lang="en-US" sz="2400" dirty="0"/>
+              <a:t> </a:t>
             </a:r>
           </a:p>
         </p:txBody>
@@ -3632,7 +3686,7 @@
     </p:spTree>
     <p:extLst>
       <p:ext uri="{BB962C8B-B14F-4D97-AF65-F5344CB8AC3E}">
-        <p14:creationId xmlns:p14="http://schemas.microsoft.com/office/powerpoint/2010/main" val="3238312985"/>
+        <p14:creationId xmlns:p14="http://schemas.microsoft.com/office/powerpoint/2010/main" val="2676337257"/>
       </p:ext>
     </p:extLst>
   </p:cSld>
@@ -3664,7 +3718,7 @@
           <p:cNvPr id="2" name="Title 1">
             <a:extLst>
               <a:ext uri="{FF2B5EF4-FFF2-40B4-BE49-F238E27FC236}">
-                <a16:creationId xmlns:a16="http://schemas.microsoft.com/office/drawing/2014/main" id="{25A10E86-323A-4A5F-8A44-80C798B6F94A}"/>
+                <a16:creationId xmlns:a16="http://schemas.microsoft.com/office/drawing/2014/main" xmlns="" id="{803F8943-A215-48C1-8774-983C39282DD9}"/>
               </a:ext>
             </a:extLst>
           </p:cNvPr>
@@ -3692,7 +3746,137 @@
           <p:cNvPr id="3" name="Content Placeholder 2">
             <a:extLst>
               <a:ext uri="{FF2B5EF4-FFF2-40B4-BE49-F238E27FC236}">
-                <a16:creationId xmlns:a16="http://schemas.microsoft.com/office/drawing/2014/main" id="{5923D958-2DEF-44B9-9FA6-A12FA07B454A}"/>
+                <a16:creationId xmlns:a16="http://schemas.microsoft.com/office/drawing/2014/main" xmlns="" id="{06058832-8E48-4073-B626-8517B6C4480D}"/>
+              </a:ext>
+            </a:extLst>
+          </p:cNvPr>
+          <p:cNvSpPr>
+            <a:spLocks noGrp="1"/>
+          </p:cNvSpPr>
+          <p:nvPr>
+            <p:ph idx="1"/>
+          </p:nvPr>
+        </p:nvSpPr>
+        <p:spPr/>
+        <p:txBody>
+          <a:bodyPr>
+            <a:normAutofit lnSpcReduction="10000"/>
+          </a:bodyPr>
+          <a:lstStyle/>
+          <a:p>
+            <a:r>
+              <a:rPr lang="pt-BR" sz="2400" dirty="0"/>
+              <a:t>&gt; str(x)</a:t>
+            </a:r>
+          </a:p>
+          <a:p>
+            <a:r>
+              <a:rPr lang="pt-BR" sz="2400" dirty="0"/>
+              <a:t>  num [1:10, 1:10] 1.204 -0.891 0.229 -1.639 -0.955 ...</a:t>
+            </a:r>
+          </a:p>
+          <a:p>
+            <a:endParaRPr lang="pt-BR" sz="2400" dirty="0"/>
+          </a:p>
+          <a:p>
+            <a:r>
+              <a:rPr lang="pt-BR" sz="2400" dirty="0"/>
+              <a:t>mean(x)</a:t>
+            </a:r>
+          </a:p>
+          <a:p>
+            <a:endParaRPr lang="en-US" sz="2400" dirty="0"/>
+          </a:p>
+          <a:p>
+            <a:r>
+              <a:rPr lang="en-US" sz="2400" dirty="0"/>
+              <a:t>X[1:4, 1:4]</a:t>
+            </a:r>
+          </a:p>
+          <a:p>
+            <a:endParaRPr lang="en-US" sz="2400" dirty="0"/>
+          </a:p>
+          <a:p>
+            <a:r>
+              <a:rPr lang="en-US" sz="2400" dirty="0"/>
+              <a:t>x^2</a:t>
+            </a:r>
+          </a:p>
+          <a:p>
+            <a:endParaRPr lang="en-US" sz="2400" dirty="0"/>
+          </a:p>
+          <a:p>
+            <a:r>
+              <a:rPr lang="en-US" sz="2400" dirty="0"/>
+              <a:t>x+1</a:t>
+            </a:r>
+          </a:p>
+        </p:txBody>
+      </p:sp>
+    </p:spTree>
+    <p:extLst>
+      <p:ext uri="{BB962C8B-B14F-4D97-AF65-F5344CB8AC3E}">
+        <p14:creationId xmlns:p14="http://schemas.microsoft.com/office/powerpoint/2010/main" val="3238312985"/>
+      </p:ext>
+    </p:extLst>
+  </p:cSld>
+  <p:clrMapOvr>
+    <a:masterClrMapping/>
+  </p:clrMapOvr>
+</p:sld>
+</file>
+
+<file path=ppt/slides/slide5.xml><?xml version="1.0" encoding="utf-8"?>
+<p:sld xmlns:a="http://schemas.openxmlformats.org/drawingml/2006/main" xmlns:r="http://schemas.openxmlformats.org/officeDocument/2006/relationships" xmlns:p="http://schemas.openxmlformats.org/presentationml/2006/main">
+  <p:cSld>
+    <p:spTree>
+      <p:nvGrpSpPr>
+        <p:cNvPr id="1" name=""/>
+        <p:cNvGrpSpPr/>
+        <p:nvPr/>
+      </p:nvGrpSpPr>
+      <p:grpSpPr>
+        <a:xfrm>
+          <a:off x="0" y="0"/>
+          <a:ext cx="0" cy="0"/>
+          <a:chOff x="0" y="0"/>
+          <a:chExt cx="0" cy="0"/>
+        </a:xfrm>
+      </p:grpSpPr>
+      <p:sp>
+        <p:nvSpPr>
+          <p:cNvPr id="2" name="Title 1">
+            <a:extLst>
+              <a:ext uri="{FF2B5EF4-FFF2-40B4-BE49-F238E27FC236}">
+                <a16:creationId xmlns:a16="http://schemas.microsoft.com/office/drawing/2014/main" xmlns="" id="{25A10E86-323A-4A5F-8A44-80C798B6F94A}"/>
+              </a:ext>
+            </a:extLst>
+          </p:cNvPr>
+          <p:cNvSpPr>
+            <a:spLocks noGrp="1"/>
+          </p:cNvSpPr>
+          <p:nvPr>
+            <p:ph type="title"/>
+          </p:nvPr>
+        </p:nvSpPr>
+        <p:spPr/>
+        <p:txBody>
+          <a:bodyPr/>
+          <a:lstStyle/>
+          <a:p>
+            <a:r>
+              <a:rPr lang="en-US" dirty="0"/>
+              <a:t>Review</a:t>
+            </a:r>
+          </a:p>
+        </p:txBody>
+      </p:sp>
+      <p:sp>
+        <p:nvSpPr>
+          <p:cNvPr id="3" name="Content Placeholder 2">
+            <a:extLst>
+              <a:ext uri="{FF2B5EF4-FFF2-40B4-BE49-F238E27FC236}">
+                <a16:creationId xmlns:a16="http://schemas.microsoft.com/office/drawing/2014/main" xmlns="" id="{5923D958-2DEF-44B9-9FA6-A12FA07B454A}"/>
               </a:ext>
             </a:extLst>
           </p:cNvPr>
@@ -3798,7 +3982,7 @@
           <p:cNvPr id="6" name="Content Placeholder 2">
             <a:extLst>
               <a:ext uri="{FF2B5EF4-FFF2-40B4-BE49-F238E27FC236}">
-                <a16:creationId xmlns:a16="http://schemas.microsoft.com/office/drawing/2014/main" id="{2D17C7B1-4ABC-4E08-911C-6F4E9450B737}"/>
+                <a16:creationId xmlns:a16="http://schemas.microsoft.com/office/drawing/2014/main" xmlns="" id="{2D17C7B1-4ABC-4E08-911C-6F4E9450B737}"/>
               </a:ext>
             </a:extLst>
           </p:cNvPr>
@@ -4064,97 +4248,6 @@
 </p:sld>
 </file>
 
-<file path=ppt/slides/slide5.xml><?xml version="1.0" encoding="utf-8"?>
-<p:sld xmlns:a="http://schemas.openxmlformats.org/drawingml/2006/main" xmlns:r="http://schemas.openxmlformats.org/officeDocument/2006/relationships" xmlns:p="http://schemas.openxmlformats.org/presentationml/2006/main">
-  <p:cSld>
-    <p:spTree>
-      <p:nvGrpSpPr>
-        <p:cNvPr id="1" name=""/>
-        <p:cNvGrpSpPr/>
-        <p:nvPr/>
-      </p:nvGrpSpPr>
-      <p:grpSpPr>
-        <a:xfrm>
-          <a:off x="0" y="0"/>
-          <a:ext cx="0" cy="0"/>
-          <a:chOff x="0" y="0"/>
-          <a:chExt cx="0" cy="0"/>
-        </a:xfrm>
-      </p:grpSpPr>
-      <p:sp>
-        <p:nvSpPr>
-          <p:cNvPr id="2" name="Title 1">
-            <a:extLst>
-              <a:ext uri="{FF2B5EF4-FFF2-40B4-BE49-F238E27FC236}">
-                <a16:creationId xmlns:a16="http://schemas.microsoft.com/office/drawing/2014/main" id="{8A0BE013-56D0-4573-A7EC-FAF8EDFBA56B}"/>
-              </a:ext>
-            </a:extLst>
-          </p:cNvPr>
-          <p:cNvSpPr>
-            <a:spLocks noGrp="1"/>
-          </p:cNvSpPr>
-          <p:nvPr>
-            <p:ph type="title"/>
-          </p:nvPr>
-        </p:nvSpPr>
-        <p:spPr/>
-        <p:txBody>
-          <a:bodyPr/>
-          <a:lstStyle/>
-          <a:p>
-            <a:r>
-              <a:rPr lang="en-US" dirty="0"/>
-              <a:t>Logic, </a:t>
-            </a:r>
-            <a:r>
-              <a:rPr lang="en-US" dirty="0" err="1"/>
-              <a:t>subsetting</a:t>
-            </a:r>
-            <a:r>
-              <a:rPr lang="en-US" dirty="0"/>
-              <a:t>, control flows</a:t>
-            </a:r>
-          </a:p>
-        </p:txBody>
-      </p:sp>
-      <p:sp>
-        <p:nvSpPr>
-          <p:cNvPr id="3" name="Content Placeholder 2">
-            <a:extLst>
-              <a:ext uri="{FF2B5EF4-FFF2-40B4-BE49-F238E27FC236}">
-                <a16:creationId xmlns:a16="http://schemas.microsoft.com/office/drawing/2014/main" id="{7567488C-241E-48E5-90DB-3741B25B4E0B}"/>
-              </a:ext>
-            </a:extLst>
-          </p:cNvPr>
-          <p:cNvSpPr>
-            <a:spLocks noGrp="1"/>
-          </p:cNvSpPr>
-          <p:nvPr>
-            <p:ph idx="1"/>
-          </p:nvPr>
-        </p:nvSpPr>
-        <p:spPr/>
-        <p:txBody>
-          <a:bodyPr/>
-          <a:lstStyle/>
-          <a:p>
-            <a:endParaRPr lang="en-US" dirty="0"/>
-          </a:p>
-        </p:txBody>
-      </p:sp>
-    </p:spTree>
-    <p:extLst>
-      <p:ext uri="{BB962C8B-B14F-4D97-AF65-F5344CB8AC3E}">
-        <p14:creationId xmlns:p14="http://schemas.microsoft.com/office/powerpoint/2010/main" val="2299628633"/>
-      </p:ext>
-    </p:extLst>
-  </p:cSld>
-  <p:clrMapOvr>
-    <a:masterClrMapping/>
-  </p:clrMapOvr>
-</p:sld>
-</file>
-
 <file path=ppt/slides/slide6.xml><?xml version="1.0" encoding="utf-8"?>
 <p:sld xmlns:a="http://schemas.openxmlformats.org/drawingml/2006/main" xmlns:r="http://schemas.openxmlformats.org/officeDocument/2006/relationships" xmlns:p="http://schemas.openxmlformats.org/presentationml/2006/main">
   <p:cSld>
@@ -4177,7 +4270,98 @@
           <p:cNvPr id="2" name="Title 1">
             <a:extLst>
               <a:ext uri="{FF2B5EF4-FFF2-40B4-BE49-F238E27FC236}">
-                <a16:creationId xmlns:a16="http://schemas.microsoft.com/office/drawing/2014/main" id="{8FDF7ED7-67EC-48C6-9724-DD448D80E3FD}"/>
+                <a16:creationId xmlns:a16="http://schemas.microsoft.com/office/drawing/2014/main" xmlns="" id="{8A0BE013-56D0-4573-A7EC-FAF8EDFBA56B}"/>
+              </a:ext>
+            </a:extLst>
+          </p:cNvPr>
+          <p:cNvSpPr>
+            <a:spLocks noGrp="1"/>
+          </p:cNvSpPr>
+          <p:nvPr>
+            <p:ph type="title"/>
+          </p:nvPr>
+        </p:nvSpPr>
+        <p:spPr/>
+        <p:txBody>
+          <a:bodyPr/>
+          <a:lstStyle/>
+          <a:p>
+            <a:r>
+              <a:rPr lang="en-US" dirty="0"/>
+              <a:t>Logic, </a:t>
+            </a:r>
+            <a:r>
+              <a:rPr lang="en-US" dirty="0" err="1"/>
+              <a:t>subsetting</a:t>
+            </a:r>
+            <a:r>
+              <a:rPr lang="en-US" dirty="0"/>
+              <a:t>, control flows</a:t>
+            </a:r>
+          </a:p>
+        </p:txBody>
+      </p:sp>
+      <p:sp>
+        <p:nvSpPr>
+          <p:cNvPr id="3" name="Content Placeholder 2">
+            <a:extLst>
+              <a:ext uri="{FF2B5EF4-FFF2-40B4-BE49-F238E27FC236}">
+                <a16:creationId xmlns:a16="http://schemas.microsoft.com/office/drawing/2014/main" xmlns="" id="{7567488C-241E-48E5-90DB-3741B25B4E0B}"/>
+              </a:ext>
+            </a:extLst>
+          </p:cNvPr>
+          <p:cNvSpPr>
+            <a:spLocks noGrp="1"/>
+          </p:cNvSpPr>
+          <p:nvPr>
+            <p:ph idx="1"/>
+          </p:nvPr>
+        </p:nvSpPr>
+        <p:spPr/>
+        <p:txBody>
+          <a:bodyPr/>
+          <a:lstStyle/>
+          <a:p>
+            <a:endParaRPr lang="en-US" dirty="0"/>
+          </a:p>
+        </p:txBody>
+      </p:sp>
+    </p:spTree>
+    <p:extLst>
+      <p:ext uri="{BB962C8B-B14F-4D97-AF65-F5344CB8AC3E}">
+        <p14:creationId xmlns:p14="http://schemas.microsoft.com/office/powerpoint/2010/main" val="2299628633"/>
+      </p:ext>
+    </p:extLst>
+  </p:cSld>
+  <p:clrMapOvr>
+    <a:masterClrMapping/>
+  </p:clrMapOvr>
+</p:sld>
+</file>
+
+<file path=ppt/slides/slide7.xml><?xml version="1.0" encoding="utf-8"?>
+<p:sld xmlns:a="http://schemas.openxmlformats.org/drawingml/2006/main" xmlns:r="http://schemas.openxmlformats.org/officeDocument/2006/relationships" xmlns:p="http://schemas.openxmlformats.org/presentationml/2006/main">
+  <p:cSld>
+    <p:spTree>
+      <p:nvGrpSpPr>
+        <p:cNvPr id="1" name=""/>
+        <p:cNvGrpSpPr/>
+        <p:nvPr/>
+      </p:nvGrpSpPr>
+      <p:grpSpPr>
+        <a:xfrm>
+          <a:off x="0" y="0"/>
+          <a:ext cx="0" cy="0"/>
+          <a:chOff x="0" y="0"/>
+          <a:chExt cx="0" cy="0"/>
+        </a:xfrm>
+      </p:grpSpPr>
+      <p:sp>
+        <p:nvSpPr>
+          <p:cNvPr id="2" name="Title 1">
+            <a:extLst>
+              <a:ext uri="{FF2B5EF4-FFF2-40B4-BE49-F238E27FC236}">
+                <a16:creationId xmlns:a16="http://schemas.microsoft.com/office/drawing/2014/main" xmlns="" id="{8FDF7ED7-67EC-48C6-9724-DD448D80E3FD}"/>
               </a:ext>
             </a:extLst>
           </p:cNvPr>
@@ -4205,7 +4389,7 @@
           <p:cNvPr id="4" name="Content Placeholder 3">
             <a:extLst>
               <a:ext uri="{FF2B5EF4-FFF2-40B4-BE49-F238E27FC236}">
-                <a16:creationId xmlns:a16="http://schemas.microsoft.com/office/drawing/2014/main" id="{FAD2B904-326E-4133-A60F-74100E217851}"/>
+                <a16:creationId xmlns:a16="http://schemas.microsoft.com/office/drawing/2014/main" xmlns="" id="{FAD2B904-326E-4133-A60F-74100E217851}"/>
               </a:ext>
             </a:extLst>
           </p:cNvPr>
@@ -4235,28 +4419,28 @@
                 <a:gridCol w="2628900">
                   <a:extLst>
                     <a:ext uri="{9D8B030D-6E8A-4147-A177-3AD203B41FA5}">
-                      <a16:colId xmlns:a16="http://schemas.microsoft.com/office/drawing/2014/main" val="2321070907"/>
+                      <a16:colId xmlns:a16="http://schemas.microsoft.com/office/drawing/2014/main" xmlns="" val="2321070907"/>
                     </a:ext>
                   </a:extLst>
                 </a:gridCol>
                 <a:gridCol w="2628900">
                   <a:extLst>
                     <a:ext uri="{9D8B030D-6E8A-4147-A177-3AD203B41FA5}">
-                      <a16:colId xmlns:a16="http://schemas.microsoft.com/office/drawing/2014/main" val="4141571024"/>
+                      <a16:colId xmlns:a16="http://schemas.microsoft.com/office/drawing/2014/main" xmlns="" val="4141571024"/>
                     </a:ext>
                   </a:extLst>
                 </a:gridCol>
                 <a:gridCol w="2628900">
                   <a:extLst>
                     <a:ext uri="{9D8B030D-6E8A-4147-A177-3AD203B41FA5}">
-                      <a16:colId xmlns:a16="http://schemas.microsoft.com/office/drawing/2014/main" val="1283090572"/>
+                      <a16:colId xmlns:a16="http://schemas.microsoft.com/office/drawing/2014/main" xmlns="" val="1283090572"/>
                     </a:ext>
                   </a:extLst>
                 </a:gridCol>
                 <a:gridCol w="2628900">
                   <a:extLst>
                     <a:ext uri="{9D8B030D-6E8A-4147-A177-3AD203B41FA5}">
-                      <a16:colId xmlns:a16="http://schemas.microsoft.com/office/drawing/2014/main" val="3394029097"/>
+                      <a16:colId xmlns:a16="http://schemas.microsoft.com/office/drawing/2014/main" xmlns="" val="3394029097"/>
                     </a:ext>
                   </a:extLst>
                 </a:gridCol>
@@ -4316,7 +4500,7 @@
                 </a:tc>
                 <a:extLst>
                   <a:ext uri="{0D108BD9-81ED-4DB2-BD59-A6C34878D82A}">
-                    <a16:rowId xmlns:a16="http://schemas.microsoft.com/office/drawing/2014/main" val="641584777"/>
+                    <a16:rowId xmlns:a16="http://schemas.microsoft.com/office/drawing/2014/main" xmlns="" val="641584777"/>
                   </a:ext>
                 </a:extLst>
               </a:tr>
@@ -4369,7 +4553,7 @@
                 </a:tc>
                 <a:extLst>
                   <a:ext uri="{0D108BD9-81ED-4DB2-BD59-A6C34878D82A}">
-                    <a16:rowId xmlns:a16="http://schemas.microsoft.com/office/drawing/2014/main" val="3967072225"/>
+                    <a16:rowId xmlns:a16="http://schemas.microsoft.com/office/drawing/2014/main" xmlns="" val="3967072225"/>
                   </a:ext>
                 </a:extLst>
               </a:tr>
@@ -4419,7 +4603,7 @@
                 </a:tc>
                 <a:extLst>
                   <a:ext uri="{0D108BD9-81ED-4DB2-BD59-A6C34878D82A}">
-                    <a16:rowId xmlns:a16="http://schemas.microsoft.com/office/drawing/2014/main" val="393046259"/>
+                    <a16:rowId xmlns:a16="http://schemas.microsoft.com/office/drawing/2014/main" xmlns="" val="393046259"/>
                   </a:ext>
                 </a:extLst>
               </a:tr>
@@ -4469,7 +4653,7 @@
                 </a:tc>
                 <a:extLst>
                   <a:ext uri="{0D108BD9-81ED-4DB2-BD59-A6C34878D82A}">
-                    <a16:rowId xmlns:a16="http://schemas.microsoft.com/office/drawing/2014/main" val="505039440"/>
+                    <a16:rowId xmlns:a16="http://schemas.microsoft.com/office/drawing/2014/main" xmlns="" val="505039440"/>
                   </a:ext>
                 </a:extLst>
               </a:tr>
@@ -4519,7 +4703,7 @@
                 </a:tc>
                 <a:extLst>
                   <a:ext uri="{0D108BD9-81ED-4DB2-BD59-A6C34878D82A}">
-                    <a16:rowId xmlns:a16="http://schemas.microsoft.com/office/drawing/2014/main" val="301247896"/>
+                    <a16:rowId xmlns:a16="http://schemas.microsoft.com/office/drawing/2014/main" xmlns="" val="301247896"/>
                   </a:ext>
                 </a:extLst>
               </a:tr>
@@ -4566,7 +4750,7 @@
                 </a:tc>
                 <a:extLst>
                   <a:ext uri="{0D108BD9-81ED-4DB2-BD59-A6C34878D82A}">
-                    <a16:rowId xmlns:a16="http://schemas.microsoft.com/office/drawing/2014/main" val="2301848084"/>
+                    <a16:rowId xmlns:a16="http://schemas.microsoft.com/office/drawing/2014/main" xmlns="" val="2301848084"/>
                   </a:ext>
                 </a:extLst>
               </a:tr>

</xml_diff>